<commit_message>
Added baseline conclusion slide
</commit_message>
<xml_diff>
--- a/Presentation/CS679Presentation2.pptx
+++ b/Presentation/CS679Presentation2.pptx
@@ -4442,7 +4442,7 @@
           <a:graphicData uri="http://schemas.openxmlformats.org/presentationml/2006/ole">
             <mc:AlternateContent xmlns:mc="http://schemas.openxmlformats.org/markup-compatibility/2006">
               <mc:Choice xmlns:v="urn:schemas-microsoft-com:vml" Requires="v">
-                <p:oleObj spid="_x0000_s3197" name="Equation" r:id="rId3" imgW="1739880" imgH="215640" progId="Equation.3">
+                <p:oleObj spid="_x0000_s3209" name="Equation" r:id="rId3" imgW="1739880" imgH="215640" progId="Equation.3">
                   <p:embed/>
                 </p:oleObj>
               </mc:Choice>
@@ -4504,7 +4504,7 @@
           <a:graphicData uri="http://schemas.openxmlformats.org/presentationml/2006/ole">
             <mc:AlternateContent xmlns:mc="http://schemas.openxmlformats.org/markup-compatibility/2006">
               <mc:Choice xmlns:v="urn:schemas-microsoft-com:vml" Requires="v">
-                <p:oleObj spid="_x0000_s3198" name="Equation" r:id="rId5" imgW="2971800" imgH="215640" progId="Equation.3">
+                <p:oleObj spid="_x0000_s3210" name="Equation" r:id="rId5" imgW="2971800" imgH="215640" progId="Equation.3">
                   <p:embed/>
                 </p:oleObj>
               </mc:Choice>
@@ -4566,7 +4566,7 @@
           <a:graphicData uri="http://schemas.openxmlformats.org/presentationml/2006/ole">
             <mc:AlternateContent xmlns:mc="http://schemas.openxmlformats.org/markup-compatibility/2006">
               <mc:Choice xmlns:v="urn:schemas-microsoft-com:vml" Requires="v">
-                <p:oleObj spid="_x0000_s3199" name="Equation" r:id="rId7" imgW="4673520" imgH="431640" progId="Equation.3">
+                <p:oleObj spid="_x0000_s3211" name="Equation" r:id="rId7" imgW="4673520" imgH="431640" progId="Equation.3">
                   <p:embed/>
                 </p:oleObj>
               </mc:Choice>
@@ -4994,7 +4994,7 @@
           <a:graphicData uri="http://schemas.openxmlformats.org/presentationml/2006/ole">
             <mc:AlternateContent xmlns:mc="http://schemas.openxmlformats.org/markup-compatibility/2006">
               <mc:Choice xmlns:v="urn:schemas-microsoft-com:vml" Requires="v">
-                <p:oleObj spid="_x0000_s3200" name="Equation" r:id="rId10" imgW="2438280" imgH="533160" progId="Equation.3">
+                <p:oleObj spid="_x0000_s3212" name="Equation" r:id="rId10" imgW="2438280" imgH="533160" progId="Equation.3">
                   <p:embed/>
                 </p:oleObj>
               </mc:Choice>
@@ -5185,7 +5185,7 @@
           <a:graphicData uri="http://schemas.openxmlformats.org/presentationml/2006/ole">
             <mc:AlternateContent xmlns:mc="http://schemas.openxmlformats.org/markup-compatibility/2006">
               <mc:Choice xmlns:v="urn:schemas-microsoft-com:vml" Requires="v">
-                <p:oleObj spid="_x0000_s3201" name="Equation" r:id="rId12" imgW="520560" imgH="215640" progId="Equation.3">
+                <p:oleObj spid="_x0000_s3213" name="Equation" r:id="rId12" imgW="520560" imgH="215640" progId="Equation.3">
                   <p:embed/>
                 </p:oleObj>
               </mc:Choice>
@@ -5247,7 +5247,7 @@
           <a:graphicData uri="http://schemas.openxmlformats.org/presentationml/2006/ole">
             <mc:AlternateContent xmlns:mc="http://schemas.openxmlformats.org/markup-compatibility/2006">
               <mc:Choice xmlns:v="urn:schemas-microsoft-com:vml" Requires="v">
-                <p:oleObj spid="_x0000_s3202" name="Equation" r:id="rId14" imgW="533160" imgH="215640" progId="Equation.3">
+                <p:oleObj spid="_x0000_s3214" name="Equation" r:id="rId14" imgW="533160" imgH="215640" progId="Equation.3">
                   <p:embed/>
                 </p:oleObj>
               </mc:Choice>
@@ -10991,6 +10991,257 @@
           </a:p>
         </p:txBody>
       </p:sp>
+      <p:sp>
+        <p:nvSpPr>
+          <p:cNvPr id="3" name="Content Placeholder 2"/>
+          <p:cNvSpPr txBox="1">
+            <a:spLocks/>
+          </p:cNvSpPr>
+          <p:nvPr/>
+        </p:nvSpPr>
+        <p:spPr>
+          <a:xfrm>
+            <a:off x="457200" y="1219200"/>
+            <a:ext cx="8229600" cy="4937760"/>
+          </a:xfrm>
+          <a:prstGeom prst="rect">
+            <a:avLst/>
+          </a:prstGeom>
+        </p:spPr>
+        <p:txBody>
+          <a:bodyPr/>
+          <a:lstStyle>
+            <a:lvl1pPr marL="274320" indent="-274320" algn="l" rtl="0" eaLnBrk="1" latinLnBrk="0" hangingPunct="1">
+              <a:spcBef>
+                <a:spcPts val="600"/>
+              </a:spcBef>
+              <a:buClr>
+                <a:schemeClr val="accent1"/>
+              </a:buClr>
+              <a:buSzPct val="76000"/>
+              <a:buFont typeface="Wingdings 3"/>
+              <a:buChar char=""/>
+              <a:defRPr kumimoji="0" sz="2600" kern="1200">
+                <a:solidFill>
+                  <a:schemeClr val="tx1"/>
+                </a:solidFill>
+                <a:latin typeface="+mn-lt"/>
+                <a:ea typeface="+mn-ea"/>
+                <a:cs typeface="+mn-cs"/>
+              </a:defRPr>
+            </a:lvl1pPr>
+            <a:lvl2pPr marL="548640" indent="-274320" algn="l" rtl="0" eaLnBrk="1" latinLnBrk="0" hangingPunct="1">
+              <a:spcBef>
+                <a:spcPts val="500"/>
+              </a:spcBef>
+              <a:buClr>
+                <a:schemeClr val="accent2"/>
+              </a:buClr>
+              <a:buSzPct val="76000"/>
+              <a:buFont typeface="Wingdings 3"/>
+              <a:buChar char=""/>
+              <a:defRPr kumimoji="0" sz="2300" kern="1200">
+                <a:solidFill>
+                  <a:schemeClr val="tx2"/>
+                </a:solidFill>
+                <a:latin typeface="+mn-lt"/>
+                <a:ea typeface="+mn-ea"/>
+                <a:cs typeface="+mn-cs"/>
+              </a:defRPr>
+            </a:lvl2pPr>
+            <a:lvl3pPr marL="822960" indent="-228600" algn="l" rtl="0" eaLnBrk="1" latinLnBrk="0" hangingPunct="1">
+              <a:spcBef>
+                <a:spcPts val="500"/>
+              </a:spcBef>
+              <a:buClr>
+                <a:schemeClr val="bg1">
+                  <a:shade val="50000"/>
+                </a:schemeClr>
+              </a:buClr>
+              <a:buSzPct val="76000"/>
+              <a:buFont typeface="Wingdings 3"/>
+              <a:buChar char=""/>
+              <a:defRPr kumimoji="0" sz="2000" kern="1200">
+                <a:solidFill>
+                  <a:schemeClr val="tx1"/>
+                </a:solidFill>
+                <a:latin typeface="+mn-lt"/>
+                <a:ea typeface="+mn-ea"/>
+                <a:cs typeface="+mn-cs"/>
+              </a:defRPr>
+            </a:lvl3pPr>
+            <a:lvl4pPr marL="1097280" indent="-228600" algn="l" rtl="0" eaLnBrk="1" latinLnBrk="0" hangingPunct="1">
+              <a:spcBef>
+                <a:spcPts val="400"/>
+              </a:spcBef>
+              <a:buClr>
+                <a:schemeClr val="accent2">
+                  <a:shade val="75000"/>
+                </a:schemeClr>
+              </a:buClr>
+              <a:buSzPct val="70000"/>
+              <a:buFont typeface="Wingdings"/>
+              <a:buChar char=""/>
+              <a:defRPr kumimoji="0" sz="1800" kern="1200">
+                <a:solidFill>
+                  <a:schemeClr val="tx1"/>
+                </a:solidFill>
+                <a:latin typeface="+mn-lt"/>
+                <a:ea typeface="+mn-ea"/>
+                <a:cs typeface="+mn-cs"/>
+              </a:defRPr>
+            </a:lvl4pPr>
+            <a:lvl5pPr marL="1371600" indent="-228600" algn="l" rtl="0" eaLnBrk="1" latinLnBrk="0" hangingPunct="1">
+              <a:spcBef>
+                <a:spcPts val="300"/>
+              </a:spcBef>
+              <a:buClr>
+                <a:schemeClr val="accent2"/>
+              </a:buClr>
+              <a:buSzPct val="70000"/>
+              <a:buFont typeface="Wingdings"/>
+              <a:buChar char=""/>
+              <a:defRPr kumimoji="0" sz="1600" kern="1200">
+                <a:solidFill>
+                  <a:schemeClr val="tx1"/>
+                </a:solidFill>
+                <a:latin typeface="+mn-lt"/>
+                <a:ea typeface="+mn-ea"/>
+                <a:cs typeface="+mn-cs"/>
+              </a:defRPr>
+            </a:lvl5pPr>
+            <a:lvl6pPr marL="1645920" indent="-182880" algn="l" rtl="0" eaLnBrk="1" latinLnBrk="0" hangingPunct="1">
+              <a:spcBef>
+                <a:spcPts val="300"/>
+              </a:spcBef>
+              <a:buClr>
+                <a:srgbClr val="9FB8CD">
+                  <a:shade val="75000"/>
+                </a:srgbClr>
+              </a:buClr>
+              <a:buSzPct val="75000"/>
+              <a:buFont typeface="Wingdings 3"/>
+              <a:buChar char=""/>
+              <a:defRPr kumimoji="0" lang="en-US" sz="1600" kern="1200" smtClean="0">
+                <a:solidFill>
+                  <a:schemeClr val="tx1"/>
+                </a:solidFill>
+                <a:latin typeface="+mn-lt"/>
+                <a:ea typeface="+mn-ea"/>
+                <a:cs typeface="+mn-cs"/>
+              </a:defRPr>
+            </a:lvl6pPr>
+            <a:lvl7pPr marL="1828800" indent="-182880" algn="l" rtl="0" eaLnBrk="1" latinLnBrk="0" hangingPunct="1">
+              <a:spcBef>
+                <a:spcPts val="300"/>
+              </a:spcBef>
+              <a:buClr>
+                <a:srgbClr val="727CA3">
+                  <a:shade val="75000"/>
+                </a:srgbClr>
+              </a:buClr>
+              <a:buSzPct val="75000"/>
+              <a:buFont typeface="Wingdings 3"/>
+              <a:buChar char=""/>
+              <a:defRPr kumimoji="0" lang="en-US" sz="1400" kern="1200" smtClean="0">
+                <a:solidFill>
+                  <a:schemeClr val="tx1"/>
+                </a:solidFill>
+                <a:latin typeface="+mn-lt"/>
+                <a:ea typeface="+mn-ea"/>
+                <a:cs typeface="+mn-cs"/>
+              </a:defRPr>
+            </a:lvl7pPr>
+            <a:lvl8pPr marL="2011680" indent="-182880" algn="l" rtl="0" eaLnBrk="1" latinLnBrk="0" hangingPunct="1">
+              <a:spcBef>
+                <a:spcPts val="300"/>
+              </a:spcBef>
+              <a:buClr>
+                <a:prstClr val="white">
+                  <a:shade val="50000"/>
+                </a:prstClr>
+              </a:buClr>
+              <a:buSzPct val="75000"/>
+              <a:buFont typeface="Wingdings 3"/>
+              <a:buChar char=""/>
+              <a:defRPr kumimoji="0" lang="en-US" sz="1400" kern="1200" smtClean="0">
+                <a:solidFill>
+                  <a:schemeClr val="tx1"/>
+                </a:solidFill>
+                <a:latin typeface="+mn-lt"/>
+                <a:ea typeface="+mn-ea"/>
+                <a:cs typeface="+mn-cs"/>
+              </a:defRPr>
+            </a:lvl8pPr>
+            <a:lvl9pPr marL="2194560" indent="-182880" algn="l" rtl="0" eaLnBrk="1" latinLnBrk="0" hangingPunct="1">
+              <a:spcBef>
+                <a:spcPts val="300"/>
+              </a:spcBef>
+              <a:buClr>
+                <a:srgbClr val="9FB8CD"/>
+              </a:buClr>
+              <a:buSzPct val="75000"/>
+              <a:buFont typeface="Wingdings 3"/>
+              <a:buChar char=""/>
+              <a:defRPr kumimoji="0" lang="en-US" sz="1200" kern="1200" smtClean="0">
+                <a:solidFill>
+                  <a:schemeClr val="tx1"/>
+                </a:solidFill>
+                <a:latin typeface="+mn-lt"/>
+                <a:ea typeface="+mn-ea"/>
+                <a:cs typeface="+mn-cs"/>
+              </a:defRPr>
+            </a:lvl9pPr>
+          </a:lstStyle>
+          <a:p>
+            <a:pPr defTabSz="914400"/>
+            <a:r>
+              <a:rPr lang="en-US" dirty="0" smtClean="0"/>
+              <a:t>Variance </a:t>
+            </a:r>
+            <a:r>
+              <a:rPr lang="en-US" dirty="0"/>
+              <a:t>of </a:t>
+            </a:r>
+            <a:r>
+              <a:rPr lang="en-US" dirty="0" smtClean="0"/>
+              <a:t>an estimator</a:t>
+            </a:r>
+          </a:p>
+          <a:p>
+            <a:pPr defTabSz="914400"/>
+            <a:r>
+              <a:rPr lang="en-US" dirty="0" smtClean="0"/>
+              <a:t>Fisher Information</a:t>
+            </a:r>
+          </a:p>
+          <a:p>
+            <a:pPr defTabSz="914400"/>
+            <a:r>
+              <a:rPr lang="en-US" dirty="0" smtClean="0"/>
+              <a:t>Cramer-Rao lower bound (CRLB)</a:t>
+            </a:r>
+          </a:p>
+          <a:p>
+            <a:pPr lvl="1" defTabSz="914400"/>
+            <a:r>
+              <a:rPr lang="en-US" dirty="0" smtClean="0"/>
+              <a:t>Quantitative measure of estimator performance</a:t>
+            </a:r>
+          </a:p>
+          <a:p>
+            <a:pPr defTabSz="914400"/>
+            <a:r>
+              <a:rPr lang="en-US" dirty="0" smtClean="0"/>
+              <a:t>Application of CRLB to image registration</a:t>
+            </a:r>
+          </a:p>
+          <a:p>
+            <a:pPr defTabSz="914400"/>
+            <a:endParaRPr lang="en-US" dirty="0"/>
+          </a:p>
+        </p:txBody>
+      </p:sp>
     </p:spTree>
     <p:extLst>
       <p:ext uri="{BB962C8B-B14F-4D97-AF65-F5344CB8AC3E}">
@@ -11176,7 +11427,7 @@
         </p:spPr>
         <p:txBody>
           <a:bodyPr>
-            <a:normAutofit fontScale="77500" lnSpcReduction="20000"/>
+            <a:normAutofit fontScale="85000" lnSpcReduction="20000"/>
           </a:bodyPr>
           <a:lstStyle/>
           <a:p>
@@ -14637,7 +14888,7 @@
           <a:graphicData uri="http://schemas.openxmlformats.org/presentationml/2006/ole">
             <mc:AlternateContent xmlns:mc="http://schemas.openxmlformats.org/markup-compatibility/2006">
               <mc:Choice xmlns:v="urn:schemas-microsoft-com:vml" Requires="v">
-                <p:oleObj spid="_x0000_s2194" name="Equation" r:id="rId4" imgW="469900" imgH="254000" progId="Equation.3">
+                <p:oleObj spid="_x0000_s2202" name="Equation" r:id="rId4" imgW="469900" imgH="254000" progId="Equation.3">
                   <p:embed/>
                 </p:oleObj>
               </mc:Choice>
@@ -14694,7 +14945,7 @@
           <a:graphicData uri="http://schemas.openxmlformats.org/presentationml/2006/ole">
             <mc:AlternateContent xmlns:mc="http://schemas.openxmlformats.org/markup-compatibility/2006">
               <mc:Choice xmlns:v="urn:schemas-microsoft-com:vml" Requires="v">
-                <p:oleObj spid="_x0000_s2195" name="Equation" r:id="rId6" imgW="482600" imgH="254000" progId="Equation.3">
+                <p:oleObj spid="_x0000_s2203" name="Equation" r:id="rId6" imgW="482600" imgH="254000" progId="Equation.3">
                   <p:embed/>
                 </p:oleObj>
               </mc:Choice>
@@ -14751,7 +15002,7 @@
           <a:graphicData uri="http://schemas.openxmlformats.org/presentationml/2006/ole">
             <mc:AlternateContent xmlns:mc="http://schemas.openxmlformats.org/markup-compatibility/2006">
               <mc:Choice xmlns:v="urn:schemas-microsoft-com:vml" Requires="v">
-                <p:oleObj spid="_x0000_s2196" name="Equation" r:id="rId8" imgW="127000" imgH="177800" progId="Equation.3">
+                <p:oleObj spid="_x0000_s2204" name="Equation" r:id="rId8" imgW="127000" imgH="177800" progId="Equation.3">
                   <p:embed/>
                 </p:oleObj>
               </mc:Choice>
@@ -14904,7 +15155,7 @@
           <a:graphicData uri="http://schemas.openxmlformats.org/presentationml/2006/ole">
             <mc:AlternateContent xmlns:mc="http://schemas.openxmlformats.org/markup-compatibility/2006">
               <mc:Choice xmlns:v="urn:schemas-microsoft-com:vml" Requires="v">
-                <p:oleObj spid="_x0000_s2197" name="Equation" r:id="rId10" imgW="2323800" imgH="660240" progId="Equation.3">
+                <p:oleObj spid="_x0000_s2205" name="Equation" r:id="rId10" imgW="2323800" imgH="660240" progId="Equation.3">
                   <p:embed/>
                 </p:oleObj>
               </mc:Choice>
@@ -15148,7 +15399,7 @@
           <a:graphicData uri="http://schemas.openxmlformats.org/presentationml/2006/ole">
             <mc:AlternateContent xmlns:mc="http://schemas.openxmlformats.org/markup-compatibility/2006">
               <mc:Choice xmlns:v="urn:schemas-microsoft-com:vml" Requires="v">
-                <p:oleObj spid="_x0000_s4128" name="Equation" r:id="rId3" imgW="2323800" imgH="660240" progId="Equation.3">
+                <p:oleObj spid="_x0000_s4130" name="Equation" r:id="rId3" imgW="2323800" imgH="660240" progId="Equation.3">
                   <p:embed/>
                 </p:oleObj>
               </mc:Choice>

</xml_diff>